<commit_message>
Finished from myside sorry
</commit_message>
<xml_diff>
--- a/Poster/EPI_Poster_Deez.pptx
+++ b/Poster/EPI_Poster_Deez.pptx
@@ -109,7 +109,7 @@
   </p:defaultTextStyle>
   <p:extLst>
     <p:ext uri="{EFAFB233-063F-42B5-8137-9DF3F51BA10A}">
-      <p15:sldGuideLst xmlns:p15="http://schemas.microsoft.com/office/powerpoint/2012/main">
+      <p15:sldGuideLst xmlns:p15="http://schemas.microsoft.com/office/powerpoint/2012/main" xmlns="">
         <p15:guide id="1" orient="horz" pos="18700">
           <p15:clr>
             <a:srgbClr val="A4A3A4"/>
@@ -294,7 +294,7 @@
             <a:fld id="{24DAF6E8-6703-474E-ABE1-29054CE273BD}" type="datetimeFigureOut">
               <a:rPr lang="de-DE" smtClean="0"/>
               <a:pPr/>
-              <a:t>13.12.2023</a:t>
+              <a:t>07.01.2024</a:t>
             </a:fld>
             <a:endParaRPr lang="de-DE"/>
           </a:p>
@@ -462,7 +462,7 @@
     </p:spTree>
     <p:extLst>
       <p:ext uri="{BB962C8B-B14F-4D97-AF65-F5344CB8AC3E}">
-        <p14:creationId xmlns:p14="http://schemas.microsoft.com/office/powerpoint/2010/main" val="2219365424"/>
+        <p14:creationId xmlns:p14="http://schemas.microsoft.com/office/powerpoint/2010/main" xmlns="" val="2219365424"/>
       </p:ext>
     </p:extLst>
   </p:cSld>
@@ -637,7 +637,7 @@
     </p:spTree>
     <p:extLst>
       <p:ext uri="{BB962C8B-B14F-4D97-AF65-F5344CB8AC3E}">
-        <p14:creationId xmlns:p14="http://schemas.microsoft.com/office/powerpoint/2010/main" val="2515711731"/>
+        <p14:creationId xmlns:p14="http://schemas.microsoft.com/office/powerpoint/2010/main" xmlns="" val="2515711731"/>
       </p:ext>
     </p:extLst>
   </p:cSld>
@@ -827,7 +827,7 @@
             <a:fld id="{AD01C36D-F5FD-447D-9F01-A9EA4F9D3B14}" type="datetimeFigureOut">
               <a:rPr lang="de-DE" smtClean="0"/>
               <a:pPr/>
-              <a:t>13.12.2023</a:t>
+              <a:t>07.01.2024</a:t>
             </a:fld>
             <a:endParaRPr lang="de-DE"/>
           </a:p>
@@ -879,7 +879,7 @@
     </p:spTree>
     <p:extLst>
       <p:ext uri="{BB962C8B-B14F-4D97-AF65-F5344CB8AC3E}">
-        <p14:creationId xmlns:p14="http://schemas.microsoft.com/office/powerpoint/2010/main" val="186601806"/>
+        <p14:creationId xmlns:p14="http://schemas.microsoft.com/office/powerpoint/2010/main" xmlns="" val="186601806"/>
       </p:ext>
     </p:extLst>
   </p:cSld>
@@ -997,7 +997,7 @@
             <a:fld id="{AD01C36D-F5FD-447D-9F01-A9EA4F9D3B14}" type="datetimeFigureOut">
               <a:rPr lang="de-DE" smtClean="0"/>
               <a:pPr/>
-              <a:t>13.12.2023</a:t>
+              <a:t>07.01.2024</a:t>
             </a:fld>
             <a:endParaRPr lang="de-DE"/>
           </a:p>
@@ -1049,7 +1049,7 @@
     </p:spTree>
     <p:extLst>
       <p:ext uri="{BB962C8B-B14F-4D97-AF65-F5344CB8AC3E}">
-        <p14:creationId xmlns:p14="http://schemas.microsoft.com/office/powerpoint/2010/main" val="399802387"/>
+        <p14:creationId xmlns:p14="http://schemas.microsoft.com/office/powerpoint/2010/main" xmlns="" val="399802387"/>
       </p:ext>
     </p:extLst>
   </p:cSld>
@@ -1177,7 +1177,7 @@
             <a:fld id="{AD01C36D-F5FD-447D-9F01-A9EA4F9D3B14}" type="datetimeFigureOut">
               <a:rPr lang="de-DE" smtClean="0"/>
               <a:pPr/>
-              <a:t>13.12.2023</a:t>
+              <a:t>07.01.2024</a:t>
             </a:fld>
             <a:endParaRPr lang="de-DE"/>
           </a:p>
@@ -1229,7 +1229,7 @@
     </p:spTree>
     <p:extLst>
       <p:ext uri="{BB962C8B-B14F-4D97-AF65-F5344CB8AC3E}">
-        <p14:creationId xmlns:p14="http://schemas.microsoft.com/office/powerpoint/2010/main" val="47760532"/>
+        <p14:creationId xmlns:p14="http://schemas.microsoft.com/office/powerpoint/2010/main" xmlns="" val="47760532"/>
       </p:ext>
     </p:extLst>
   </p:cSld>
@@ -1347,7 +1347,7 @@
             <a:fld id="{AD01C36D-F5FD-447D-9F01-A9EA4F9D3B14}" type="datetimeFigureOut">
               <a:rPr lang="de-DE" smtClean="0"/>
               <a:pPr/>
-              <a:t>13.12.2023</a:t>
+              <a:t>07.01.2024</a:t>
             </a:fld>
             <a:endParaRPr lang="de-DE"/>
           </a:p>
@@ -1399,7 +1399,7 @@
     </p:spTree>
     <p:extLst>
       <p:ext uri="{BB962C8B-B14F-4D97-AF65-F5344CB8AC3E}">
-        <p14:creationId xmlns:p14="http://schemas.microsoft.com/office/powerpoint/2010/main" val="4067750629"/>
+        <p14:creationId xmlns:p14="http://schemas.microsoft.com/office/powerpoint/2010/main" xmlns="" val="4067750629"/>
       </p:ext>
     </p:extLst>
   </p:cSld>
@@ -1594,7 +1594,7 @@
             <a:fld id="{AD01C36D-F5FD-447D-9F01-A9EA4F9D3B14}" type="datetimeFigureOut">
               <a:rPr lang="de-DE" smtClean="0"/>
               <a:pPr/>
-              <a:t>13.12.2023</a:t>
+              <a:t>07.01.2024</a:t>
             </a:fld>
             <a:endParaRPr lang="de-DE"/>
           </a:p>
@@ -1646,7 +1646,7 @@
     </p:spTree>
     <p:extLst>
       <p:ext uri="{BB962C8B-B14F-4D97-AF65-F5344CB8AC3E}">
-        <p14:creationId xmlns:p14="http://schemas.microsoft.com/office/powerpoint/2010/main" val="3845039458"/>
+        <p14:creationId xmlns:p14="http://schemas.microsoft.com/office/powerpoint/2010/main" xmlns="" val="3845039458"/>
       </p:ext>
     </p:extLst>
   </p:cSld>
@@ -1881,7 +1881,7 @@
             <a:fld id="{AD01C36D-F5FD-447D-9F01-A9EA4F9D3B14}" type="datetimeFigureOut">
               <a:rPr lang="de-DE" smtClean="0"/>
               <a:pPr/>
-              <a:t>13.12.2023</a:t>
+              <a:t>07.01.2024</a:t>
             </a:fld>
             <a:endParaRPr lang="de-DE"/>
           </a:p>
@@ -1933,7 +1933,7 @@
     </p:spTree>
     <p:extLst>
       <p:ext uri="{BB962C8B-B14F-4D97-AF65-F5344CB8AC3E}">
-        <p14:creationId xmlns:p14="http://schemas.microsoft.com/office/powerpoint/2010/main" val="2738841527"/>
+        <p14:creationId xmlns:p14="http://schemas.microsoft.com/office/powerpoint/2010/main" xmlns="" val="2738841527"/>
       </p:ext>
     </p:extLst>
   </p:cSld>
@@ -2302,7 +2302,7 @@
             <a:fld id="{AD01C36D-F5FD-447D-9F01-A9EA4F9D3B14}" type="datetimeFigureOut">
               <a:rPr lang="de-DE" smtClean="0"/>
               <a:pPr/>
-              <a:t>13.12.2023</a:t>
+              <a:t>07.01.2024</a:t>
             </a:fld>
             <a:endParaRPr lang="de-DE"/>
           </a:p>
@@ -2354,7 +2354,7 @@
     </p:spTree>
     <p:extLst>
       <p:ext uri="{BB962C8B-B14F-4D97-AF65-F5344CB8AC3E}">
-        <p14:creationId xmlns:p14="http://schemas.microsoft.com/office/powerpoint/2010/main" val="1386793466"/>
+        <p14:creationId xmlns:p14="http://schemas.microsoft.com/office/powerpoint/2010/main" xmlns="" val="1386793466"/>
       </p:ext>
     </p:extLst>
   </p:cSld>
@@ -2421,7 +2421,7 @@
             <a:fld id="{AD01C36D-F5FD-447D-9F01-A9EA4F9D3B14}" type="datetimeFigureOut">
               <a:rPr lang="de-DE" smtClean="0"/>
               <a:pPr/>
-              <a:t>13.12.2023</a:t>
+              <a:t>07.01.2024</a:t>
             </a:fld>
             <a:endParaRPr lang="de-DE"/>
           </a:p>
@@ -2473,7 +2473,7 @@
     </p:spTree>
     <p:extLst>
       <p:ext uri="{BB962C8B-B14F-4D97-AF65-F5344CB8AC3E}">
-        <p14:creationId xmlns:p14="http://schemas.microsoft.com/office/powerpoint/2010/main" val="3828744356"/>
+        <p14:creationId xmlns:p14="http://schemas.microsoft.com/office/powerpoint/2010/main" xmlns="" val="3828744356"/>
       </p:ext>
     </p:extLst>
   </p:cSld>
@@ -2518,7 +2518,7 @@
             <a:fld id="{AD01C36D-F5FD-447D-9F01-A9EA4F9D3B14}" type="datetimeFigureOut">
               <a:rPr lang="de-DE" smtClean="0"/>
               <a:pPr/>
-              <a:t>13.12.2023</a:t>
+              <a:t>07.01.2024</a:t>
             </a:fld>
             <a:endParaRPr lang="de-DE"/>
           </a:p>
@@ -2570,7 +2570,7 @@
     </p:spTree>
     <p:extLst>
       <p:ext uri="{BB962C8B-B14F-4D97-AF65-F5344CB8AC3E}">
-        <p14:creationId xmlns:p14="http://schemas.microsoft.com/office/powerpoint/2010/main" val="984952912"/>
+        <p14:creationId xmlns:p14="http://schemas.microsoft.com/office/powerpoint/2010/main" xmlns="" val="984952912"/>
       </p:ext>
     </p:extLst>
   </p:cSld>
@@ -2795,7 +2795,7 @@
             <a:fld id="{AD01C36D-F5FD-447D-9F01-A9EA4F9D3B14}" type="datetimeFigureOut">
               <a:rPr lang="de-DE" smtClean="0"/>
               <a:pPr/>
-              <a:t>13.12.2023</a:t>
+              <a:t>07.01.2024</a:t>
             </a:fld>
             <a:endParaRPr lang="de-DE"/>
           </a:p>
@@ -2847,7 +2847,7 @@
     </p:spTree>
     <p:extLst>
       <p:ext uri="{BB962C8B-B14F-4D97-AF65-F5344CB8AC3E}">
-        <p14:creationId xmlns:p14="http://schemas.microsoft.com/office/powerpoint/2010/main" val="2050872521"/>
+        <p14:creationId xmlns:p14="http://schemas.microsoft.com/office/powerpoint/2010/main" xmlns="" val="2050872521"/>
       </p:ext>
     </p:extLst>
   </p:cSld>
@@ -3049,7 +3049,7 @@
             <a:fld id="{AD01C36D-F5FD-447D-9F01-A9EA4F9D3B14}" type="datetimeFigureOut">
               <a:rPr lang="de-DE" smtClean="0"/>
               <a:pPr/>
-              <a:t>13.12.2023</a:t>
+              <a:t>07.01.2024</a:t>
             </a:fld>
             <a:endParaRPr lang="de-DE"/>
           </a:p>
@@ -3101,7 +3101,7 @@
     </p:spTree>
     <p:extLst>
       <p:ext uri="{BB962C8B-B14F-4D97-AF65-F5344CB8AC3E}">
-        <p14:creationId xmlns:p14="http://schemas.microsoft.com/office/powerpoint/2010/main" val="1961220625"/>
+        <p14:creationId xmlns:p14="http://schemas.microsoft.com/office/powerpoint/2010/main" xmlns="" val="1961220625"/>
       </p:ext>
     </p:extLst>
   </p:cSld>
@@ -3262,7 +3262,7 @@
             <a:fld id="{AD01C36D-F5FD-447D-9F01-A9EA4F9D3B14}" type="datetimeFigureOut">
               <a:rPr lang="de-DE" smtClean="0"/>
               <a:pPr/>
-              <a:t>13.12.2023</a:t>
+              <a:t>07.01.2024</a:t>
             </a:fld>
             <a:endParaRPr lang="de-DE"/>
           </a:p>
@@ -3350,7 +3350,7 @@
     </p:spTree>
     <p:extLst>
       <p:ext uri="{BB962C8B-B14F-4D97-AF65-F5344CB8AC3E}">
-        <p14:creationId xmlns:p14="http://schemas.microsoft.com/office/powerpoint/2010/main" val="2364942439"/>
+        <p14:creationId xmlns:p14="http://schemas.microsoft.com/office/powerpoint/2010/main" xmlns="" val="2364942439"/>
       </p:ext>
     </p:extLst>
   </p:cSld>
@@ -3645,9 +3645,9 @@
           <p:nvPr/>
         </p:nvSpPr>
         <p:spPr>
-          <a:xfrm rot="1311347">
-            <a:off x="1663854" y="11819118"/>
-            <a:ext cx="19514938" cy="858439"/>
+          <a:xfrm>
+            <a:off x="692080" y="8853443"/>
+            <a:ext cx="19361026" cy="4714908"/>
           </a:xfrm>
           <a:prstGeom prst="roundRect">
             <a:avLst/>
@@ -3674,9 +3674,66 @@
           <a:p>
             <a:pPr algn="ctr"/>
             <a:r>
-              <a:rPr lang="de-DE" sz="4800" dirty="0"/>
-              <a:t>METHODE: Vorgehen, Recherche</a:t>
-            </a:r>
+              <a:rPr lang="de-DE" sz="4800" dirty="0" smtClean="0"/>
+              <a:t>Als Denkwerkzeuge wurden die </a:t>
+            </a:r>
+            <a:r>
+              <a:rPr lang="de-DE" sz="4800" dirty="0" err="1" smtClean="0"/>
+              <a:t>Methodiken</a:t>
+            </a:r>
+            <a:r>
+              <a:rPr lang="de-DE" sz="4800" dirty="0" smtClean="0"/>
+              <a:t> „On </a:t>
+            </a:r>
+            <a:r>
+              <a:rPr lang="de-DE" sz="4800" dirty="0" err="1" smtClean="0"/>
+              <a:t>the</a:t>
+            </a:r>
+            <a:r>
+              <a:rPr lang="de-DE" sz="4800" dirty="0" smtClean="0"/>
+              <a:t> </a:t>
+            </a:r>
+            <a:r>
+              <a:rPr lang="de-DE" sz="4800" dirty="0" err="1" smtClean="0"/>
+              <a:t>Shoulders</a:t>
+            </a:r>
+            <a:r>
+              <a:rPr lang="de-DE" sz="4800" dirty="0" smtClean="0"/>
+              <a:t> </a:t>
+            </a:r>
+            <a:r>
+              <a:rPr lang="de-DE" sz="4800" dirty="0" err="1" smtClean="0"/>
+              <a:t>of</a:t>
+            </a:r>
+            <a:r>
+              <a:rPr lang="de-DE" sz="4800" dirty="0" smtClean="0"/>
+              <a:t> </a:t>
+            </a:r>
+            <a:r>
+              <a:rPr lang="de-DE" sz="4800" dirty="0" err="1" smtClean="0"/>
+              <a:t>Giants</a:t>
+            </a:r>
+            <a:r>
+              <a:rPr lang="de-DE" sz="4800" dirty="0" smtClean="0"/>
+              <a:t>“ und „Feedback“ verwendet. Zur </a:t>
+            </a:r>
+            <a:r>
+              <a:rPr lang="de-DE" sz="4800" dirty="0" err="1" smtClean="0"/>
+              <a:t>befragung</a:t>
+            </a:r>
+            <a:r>
+              <a:rPr lang="de-DE" sz="4800" dirty="0" smtClean="0"/>
+              <a:t> haben wir Studenten und Ehemalige Studenten befragt zu diesen Themen und sie um eine Reflektion und Verbesserung ihres </a:t>
+            </a:r>
+            <a:r>
+              <a:rPr lang="de-DE" sz="4800" dirty="0" err="1" smtClean="0"/>
+              <a:t>studiums</a:t>
+            </a:r>
+            <a:r>
+              <a:rPr lang="de-DE" sz="4800" dirty="0" smtClean="0"/>
+              <a:t> gefragt.</a:t>
+            </a:r>
+            <a:endParaRPr lang="de-DE" sz="4800" dirty="0"/>
           </a:p>
         </p:txBody>
       </p:sp>
@@ -3688,7 +3745,7 @@
         </p:nvSpPr>
         <p:spPr>
           <a:xfrm>
-            <a:off x="827534" y="2610595"/>
+            <a:off x="334890" y="2995527"/>
             <a:ext cx="20235018" cy="3024336"/>
           </a:xfrm>
           <a:prstGeom prst="roundRect">
@@ -3720,12 +3777,13 @@
           <a:lstStyle/>
           <a:p>
             <a:r>
-              <a:rPr lang="de-DE" sz="5400" b="1" dirty="0">
+              <a:rPr lang="de-DE" sz="5400" b="1" dirty="0" smtClean="0">
                 <a:solidFill>
                   <a:schemeClr val="tx1"/>
                 </a:solidFill>
+                <a:latin typeface="Myriad Pro" pitchFamily="34" charset="0"/>
               </a:rPr>
-              <a:t>&lt;Title&gt;</a:t>
+              <a:t>Stellungnahme zum Studium mit Reflektion des Gelerntem Wissen</a:t>
             </a:r>
             <a:endParaRPr lang="de-DE" sz="5400" b="1" dirty="0">
               <a:solidFill>
@@ -3736,7 +3794,7 @@
           </a:p>
           <a:p>
             <a:r>
-              <a:rPr lang="de-DE" sz="3600" b="1" smtClean="0">
+              <a:rPr lang="de-DE" sz="3600" b="1" dirty="0" err="1" smtClean="0">
                 <a:solidFill>
                   <a:schemeClr val="tx1"/>
                 </a:solidFill>
@@ -3760,9 +3818,9 @@
           <p:nvPr/>
         </p:nvSpPr>
         <p:spPr>
-          <a:xfrm rot="20135303">
-            <a:off x="1735862" y="8090738"/>
-            <a:ext cx="19370922" cy="781200"/>
+          <a:xfrm>
+            <a:off x="620642" y="6424551"/>
+            <a:ext cx="19370922" cy="2071702"/>
           </a:xfrm>
           <a:prstGeom prst="roundRect">
             <a:avLst/>
@@ -3789,9 +3847,10 @@
           <a:p>
             <a:pPr algn="ctr"/>
             <a:r>
-              <a:rPr lang="de-DE" sz="4800" dirty="0"/>
-              <a:t>EINELITUNG: Thema,  Ziel (eigenständig konkretisieren)</a:t>
-            </a:r>
+              <a:rPr lang="de-DE" sz="4800" dirty="0" smtClean="0"/>
+              <a:t>In diesem Wissensgraph haben wir ein wenig Recherchiert wie der Generelle aufbau der Hochschule ist mit Wissen und Meinungen von Studenten und eine Generelle Wissensstruktur zum Thema Programmieren</a:t>
+            </a:r>
+            <a:endParaRPr lang="de-DE" sz="4800" dirty="0"/>
           </a:p>
         </p:txBody>
       </p:sp>
@@ -3876,7 +3935,7 @@
           <p:cNvPr id="11" name="Picture 2">
             <a:extLst>
               <a:ext uri="{FF2B5EF4-FFF2-40B4-BE49-F238E27FC236}">
-                <a16:creationId xmlns:a16="http://schemas.microsoft.com/office/drawing/2014/main" xmlns="" id="{33D3B7C0-37A6-4302-8D66-28FA2456B648}"/>
+                <a16:creationId xmlns="" xmlns:a16="http://schemas.microsoft.com/office/drawing/2014/main" id="{33D3B7C0-37A6-4302-8D66-28FA2456B648}"/>
               </a:ext>
             </a:extLst>
           </p:cNvPr>
@@ -3889,7 +3948,7 @@
           <a:blip r:embed="rId3" cstate="print">
             <a:extLst>
               <a:ext uri="{28A0092B-C50C-407E-A947-70E740481C1C}">
-                <a14:useLocalDpi xmlns:a14="http://schemas.microsoft.com/office/drawing/2010/main" val="0"/>
+                <a14:useLocalDpi xmlns:a14="http://schemas.microsoft.com/office/drawing/2010/main" xmlns="" val="0"/>
               </a:ext>
             </a:extLst>
           </a:blip>
@@ -3909,7 +3968,7 @@
           <a:noFill/>
           <a:extLst>
             <a:ext uri="{909E8E84-426E-40DD-AFC4-6F175D3DCCD1}">
-              <a14:hiddenFill xmlns:a14="http://schemas.microsoft.com/office/drawing/2010/main">
+              <a14:hiddenFill xmlns:a14="http://schemas.microsoft.com/office/drawing/2010/main" xmlns="">
                 <a:solidFill>
                   <a:srgbClr val="FFFFFF"/>
                 </a:solidFill>
@@ -3923,7 +3982,7 @@
           <p:cNvPr id="5" name="Textfeld 4">
             <a:extLst>
               <a:ext uri="{FF2B5EF4-FFF2-40B4-BE49-F238E27FC236}">
-                <a16:creationId xmlns:a16="http://schemas.microsoft.com/office/drawing/2014/main" xmlns="" id="{AC065862-84AF-47DF-FC2A-6F4AD002734A}"/>
+                <a16:creationId xmlns="" xmlns:a16="http://schemas.microsoft.com/office/drawing/2014/main" id="{AC065862-84AF-47DF-FC2A-6F4AD002734A}"/>
               </a:ext>
             </a:extLst>
           </p:cNvPr>
@@ -3958,7 +4017,7 @@
           <p:cNvPr id="14" name="Abgerundetes Rechteck 13">
             <a:extLst>
               <a:ext uri="{FF2B5EF4-FFF2-40B4-BE49-F238E27FC236}">
-                <a16:creationId xmlns:a16="http://schemas.microsoft.com/office/drawing/2014/main" xmlns="" id="{995AE831-735D-73A6-324B-40E8A0BFA5CB}"/>
+                <a16:creationId xmlns="" xmlns:a16="http://schemas.microsoft.com/office/drawing/2014/main" id="{995AE831-735D-73A6-324B-40E8A0BFA5CB}"/>
               </a:ext>
             </a:extLst>
           </p:cNvPr>
@@ -3966,8 +4025,8 @@
           <p:nvPr/>
         </p:nvSpPr>
         <p:spPr>
-          <a:xfrm rot="21252943">
-            <a:off x="860992" y="21476929"/>
+          <a:xfrm>
+            <a:off x="1049270" y="18926201"/>
             <a:ext cx="19514938" cy="1509881"/>
           </a:xfrm>
           <a:prstGeom prst="roundRect">
@@ -4003,154 +4062,10 @@
       </p:sp>
       <p:sp>
         <p:nvSpPr>
-          <p:cNvPr id="17" name="Textfeld 16">
-            <a:extLst>
-              <a:ext uri="{FF2B5EF4-FFF2-40B4-BE49-F238E27FC236}">
-                <a16:creationId xmlns:a16="http://schemas.microsoft.com/office/drawing/2014/main" xmlns="" id="{2632AE04-BC39-806D-AC28-AEE9FB54E5A1}"/>
-              </a:ext>
-            </a:extLst>
-          </p:cNvPr>
-          <p:cNvSpPr txBox="1"/>
-          <p:nvPr/>
-        </p:nvSpPr>
-        <p:spPr>
-          <a:xfrm>
-            <a:off x="1385694" y="13361564"/>
-            <a:ext cx="14349890" cy="4401205"/>
-          </a:xfrm>
-          <a:prstGeom prst="rect">
-            <a:avLst/>
-          </a:prstGeom>
-          <a:noFill/>
-        </p:spPr>
-        <p:txBody>
-          <a:bodyPr wrap="none" rtlCol="0">
-            <a:spAutoFit/>
-          </a:bodyPr>
-          <a:lstStyle/>
-          <a:p>
-            <a:pPr marL="571500" indent="-571500">
-              <a:buFont typeface="Arial" panose="020B0604020202020204" pitchFamily="34" charset="0"/>
-              <a:buChar char="•"/>
-            </a:pPr>
-            <a:r>
-              <a:rPr lang="de-DE" sz="4000" dirty="0">
-                <a:highlight>
-                  <a:srgbClr val="FFFF00"/>
-                </a:highlight>
-              </a:rPr>
-              <a:t>Bitte werden Sie hier kreativ, </a:t>
-            </a:r>
-          </a:p>
-          <a:p>
-            <a:pPr marL="571500" indent="-571500">
-              <a:buFont typeface="Arial" panose="020B0604020202020204" pitchFamily="34" charset="0"/>
-              <a:buChar char="•"/>
-            </a:pPr>
-            <a:r>
-              <a:rPr lang="de-DE" sz="4000" dirty="0">
-                <a:highlight>
-                  <a:srgbClr val="FFFF00"/>
-                </a:highlight>
-              </a:rPr>
-              <a:t>Das Template zeigt nur die Teile, die wir mindestens sehen wollen</a:t>
-            </a:r>
-          </a:p>
-          <a:p>
-            <a:pPr marL="571500" indent="-571500">
-              <a:buFont typeface="Arial" panose="020B0604020202020204" pitchFamily="34" charset="0"/>
-              <a:buChar char="•"/>
-            </a:pPr>
-            <a:r>
-              <a:rPr lang="de-DE" sz="4000" dirty="0">
-                <a:highlight>
-                  <a:srgbClr val="FFFF00"/>
-                </a:highlight>
-              </a:rPr>
-              <a:t>Gerne auch Bilder</a:t>
-            </a:r>
-          </a:p>
-          <a:p>
-            <a:pPr marL="571500" indent="-571500">
-              <a:buFont typeface="Arial" panose="020B0604020202020204" pitchFamily="34" charset="0"/>
-              <a:buChar char="•"/>
-            </a:pPr>
-            <a:r>
-              <a:rPr lang="de-DE" sz="4000" dirty="0">
-                <a:highlight>
-                  <a:srgbClr val="FFFF00"/>
-                </a:highlight>
-              </a:rPr>
-              <a:t>Vielleicht Verweis auf genutzte Denkwerkzeuge ;)</a:t>
-            </a:r>
-          </a:p>
-          <a:p>
-            <a:pPr marL="571500" indent="-571500">
-              <a:buFont typeface="Arial" panose="020B0604020202020204" pitchFamily="34" charset="0"/>
-              <a:buChar char="•"/>
-            </a:pPr>
-            <a:r>
-              <a:rPr lang="de-DE" sz="4000" dirty="0">
-                <a:highlight>
-                  <a:srgbClr val="FFFF00"/>
-                </a:highlight>
-              </a:rPr>
-              <a:t>Sie dürfen Schriftart, Formen und Farben ändern</a:t>
-            </a:r>
-          </a:p>
-          <a:p>
-            <a:pPr marL="571500" indent="-571500">
-              <a:buFont typeface="Arial" panose="020B0604020202020204" pitchFamily="34" charset="0"/>
-              <a:buChar char="•"/>
-            </a:pPr>
-            <a:r>
-              <a:rPr lang="de-DE" sz="4000" dirty="0">
-                <a:highlight>
-                  <a:srgbClr val="FFFF00"/>
-                </a:highlight>
-              </a:rPr>
-              <a:t>Das darf hier Spaß machen </a:t>
-            </a:r>
-            <a:r>
-              <a:rPr lang="de-DE" sz="4000" dirty="0">
-                <a:highlight>
-                  <a:srgbClr val="FFFF00"/>
-                </a:highlight>
-                <a:sym typeface="Wingdings" pitchFamily="2" charset="2"/>
-              </a:rPr>
-              <a:t></a:t>
-            </a:r>
-            <a:endParaRPr lang="de-DE" sz="4000" dirty="0">
-              <a:highlight>
-                <a:srgbClr val="FFFF00"/>
-              </a:highlight>
-            </a:endParaRPr>
-          </a:p>
-          <a:p>
-            <a:pPr marL="571500" indent="-571500">
-              <a:buFont typeface="Arial" panose="020B0604020202020204" pitchFamily="34" charset="0"/>
-              <a:buChar char="•"/>
-            </a:pPr>
-            <a:r>
-              <a:rPr lang="de-DE" sz="4000" dirty="0">
-                <a:solidFill>
-                  <a:srgbClr val="FF0000"/>
-                </a:solidFill>
-                <a:highlight>
-                  <a:srgbClr val="FFFF00"/>
-                </a:highlight>
-              </a:rPr>
-              <a:t>Größe/ Format der PPT darf nicht geändert werden</a:t>
-            </a:r>
-          </a:p>
-        </p:txBody>
-      </p:sp>
-      <p:sp>
-        <p:nvSpPr>
           <p:cNvPr id="6" name="Abgerundetes Rechteck 5">
             <a:extLst>
               <a:ext uri="{FF2B5EF4-FFF2-40B4-BE49-F238E27FC236}">
-                <a16:creationId xmlns:a16="http://schemas.microsoft.com/office/drawing/2014/main" xmlns="" id="{E68F8831-1EB2-C7EE-3A99-E71F5DD89C5F}"/>
+                <a16:creationId xmlns="" xmlns:a16="http://schemas.microsoft.com/office/drawing/2014/main" id="{E68F8831-1EB2-C7EE-3A99-E71F5DD89C5F}"/>
               </a:ext>
             </a:extLst>
           </p:cNvPr>
@@ -4158,8 +4073,8 @@
           <p:nvPr/>
         </p:nvSpPr>
         <p:spPr>
-          <a:xfrm rot="619918">
-            <a:off x="706877" y="19440669"/>
+          <a:xfrm rot="291993">
+            <a:off x="615195" y="15537873"/>
             <a:ext cx="19514938" cy="700848"/>
           </a:xfrm>
           <a:prstGeom prst="roundRect">
@@ -4188,20 +4103,15 @@
             <a:pPr algn="ctr"/>
             <a:r>
               <a:rPr lang="de-DE" sz="4800" dirty="0"/>
-              <a:t>Struktur Ihres </a:t>
-            </a:r>
-            <a:r>
-              <a:rPr lang="de-DE" sz="4800"/>
-              <a:t>Codes:</a:t>
-            </a:r>
-            <a:endParaRPr lang="de-DE" sz="4800" dirty="0"/>
+              <a:t>Struktur Ihres Codes:</a:t>
+            </a:r>
           </a:p>
         </p:txBody>
       </p:sp>
     </p:spTree>
     <p:extLst>
       <p:ext uri="{BB962C8B-B14F-4D97-AF65-F5344CB8AC3E}">
-        <p14:creationId xmlns:p14="http://schemas.microsoft.com/office/powerpoint/2010/main" val="1408637754"/>
+        <p14:creationId xmlns:p14="http://schemas.microsoft.com/office/powerpoint/2010/main" xmlns="" val="1408637754"/>
       </p:ext>
     </p:extLst>
   </p:cSld>

</xml_diff>